<commit_message>
DOC: Add v1.63.0 release changes
</commit_message>
<xml_diff>
--- a/pptxhandler/death/template.pptx
+++ b/pptxhandler/death/template.pptx
@@ -971,6 +971,15 @@
 <file path=ppt/slides/slide1.xml><?xml version="1.0" encoding="utf-8"?>
 <p:sld xmlns:a="http://schemas.openxmlformats.org/drawingml/2006/main" xmlns:r="http://schemas.openxmlformats.org/officeDocument/2006/relationships" xmlns:p="http://schemas.openxmlformats.org/presentationml/2006/main">
   <p:cSld>
+    <p:bg>
+      <p:bgPr>
+        <a:blipFill>
+          <a:blip r:embed="rId2"/>
+          <a:tile tx="0" ty="0" sx="100000" sy="100000" flip="none" algn="tl"/>
+        </a:blipFill>
+        <a:effectLst/>
+      </p:bgPr>
+    </p:bg>
     <p:spTree>
       <p:nvGrpSpPr>
         <p:cNvPr id="1" name=""/>
@@ -1191,7 +1200,9 @@
           <a:prstGeom prst="rect">
             <a:avLst/>
           </a:prstGeom>
-          <a:noFill/>
+          <a:solidFill>
+            <a:schemeClr val="accent2"/>
+          </a:solidFill>
           <a:ln>
             <a:noFill/>
           </a:ln>
@@ -1223,11 +1234,11 @@
               </a:lnSpc>
             </a:pPr>
             <a:r>
-              <a:rPr lang="en-US" sz="1200" dirty="0">
+              <a:rPr lang="en-US" b="1" dirty="0">
                 <a:solidFill>
-                  <a:schemeClr val="tx1"/>
+                  <a:schemeClr val="bg1"/>
                 </a:solidFill>
-                <a:latin typeface="Inconsolata" panose="00000509000000000000" pitchFamily="49" charset="0"/>
+                <a:latin typeface="Grotesque" panose="020B0604020202020204" pitchFamily="34" charset="0"/>
               </a:rPr>
               <a:t>Age</a:t>
             </a:r>

</xml_diff>

<commit_message>
BUG: Revert to original template for pptxhandler/death/
</commit_message>
<xml_diff>
--- a/pptxhandler/death/template.pptx
+++ b/pptxhandler/death/template.pptx
@@ -971,15 +971,6 @@
 <file path=ppt/slides/slide1.xml><?xml version="1.0" encoding="utf-8"?>
 <p:sld xmlns:a="http://schemas.openxmlformats.org/drawingml/2006/main" xmlns:r="http://schemas.openxmlformats.org/officeDocument/2006/relationships" xmlns:p="http://schemas.openxmlformats.org/presentationml/2006/main">
   <p:cSld>
-    <p:bg>
-      <p:bgPr>
-        <a:blipFill>
-          <a:blip r:embed="rId2"/>
-          <a:tile tx="0" ty="0" sx="100000" sy="100000" flip="none" algn="tl"/>
-        </a:blipFill>
-        <a:effectLst/>
-      </p:bgPr>
-    </p:bg>
     <p:spTree>
       <p:nvGrpSpPr>
         <p:cNvPr id="1" name=""/>
@@ -1200,9 +1191,7 @@
           <a:prstGeom prst="rect">
             <a:avLst/>
           </a:prstGeom>
-          <a:solidFill>
-            <a:schemeClr val="accent2"/>
-          </a:solidFill>
+          <a:noFill/>
           <a:ln>
             <a:noFill/>
           </a:ln>
@@ -1234,11 +1223,11 @@
               </a:lnSpc>
             </a:pPr>
             <a:r>
-              <a:rPr lang="en-US" b="1" dirty="0">
+              <a:rPr lang="en-US" sz="1200" dirty="0">
                 <a:solidFill>
-                  <a:schemeClr val="bg1"/>
+                  <a:schemeClr val="tx1"/>
                 </a:solidFill>
-                <a:latin typeface="Grotesque" panose="020B0604020202020204" pitchFamily="34" charset="0"/>
+                <a:latin typeface="Inconsolata" panose="00000509000000000000" pitchFamily="49" charset="0"/>
               </a:rPr>
               <a:t>Age</a:t>
             </a:r>

</xml_diff>